<commit_message>
Revert "Watashi wa....... ZERO"
This reverts commit d7dd91b25b7e8c1d5d24e6a7182e46adbcffccf4.
</commit_message>
<xml_diff>
--- a/roadrunner.pptx
+++ b/roadrunner.pptx
@@ -6,8 +6,8 @@
   </p:sldMasterIdLst>
   <p:sldIdLst>
     <p:sldId id="256" r:id="rId2"/>
-    <p:sldId id="257" r:id="rId3"/>
-    <p:sldId id="259" r:id="rId4"/>
+    <p:sldId id="259" r:id="rId3"/>
+    <p:sldId id="257" r:id="rId4"/>
     <p:sldId id="261" r:id="rId5"/>
     <p:sldId id="258" r:id="rId6"/>
     <p:sldId id="260" r:id="rId7"/>
@@ -246,7 +246,7 @@
           <a:p>
             <a:fld id="{16828D75-A7DB-4752-86FD-E1CAE243E2A1}" type="datetimeFigureOut">
               <a:rPr lang="en-US" smtClean="0"/>
-              <a:t>3/10/2014</a:t>
+              <a:t>3/6/2014</a:t>
             </a:fld>
             <a:endParaRPr lang="en-US"/>
           </a:p>
@@ -559,7 +559,7 @@
           <a:p>
             <a:fld id="{16828D75-A7DB-4752-86FD-E1CAE243E2A1}" type="datetimeFigureOut">
               <a:rPr lang="en-US" smtClean="0"/>
-              <a:t>3/10/2014</a:t>
+              <a:t>3/6/2014</a:t>
             </a:fld>
             <a:endParaRPr lang="en-US"/>
           </a:p>
@@ -744,7 +744,7 @@
           <a:p>
             <a:fld id="{16828D75-A7DB-4752-86FD-E1CAE243E2A1}" type="datetimeFigureOut">
               <a:rPr lang="en-US" smtClean="0"/>
-              <a:t>3/10/2014</a:t>
+              <a:t>3/6/2014</a:t>
             </a:fld>
             <a:endParaRPr lang="en-US"/>
           </a:p>
@@ -919,7 +919,7 @@
           <a:p>
             <a:fld id="{16828D75-A7DB-4752-86FD-E1CAE243E2A1}" type="datetimeFigureOut">
               <a:rPr lang="en-US" smtClean="0"/>
-              <a:t>3/10/2014</a:t>
+              <a:t>3/6/2014</a:t>
             </a:fld>
             <a:endParaRPr lang="en-US"/>
           </a:p>
@@ -1187,7 +1187,7 @@
           <a:p>
             <a:fld id="{16828D75-A7DB-4752-86FD-E1CAE243E2A1}" type="datetimeFigureOut">
               <a:rPr lang="en-US" smtClean="0"/>
-              <a:t>3/10/2014</a:t>
+              <a:t>3/6/2014</a:t>
             </a:fld>
             <a:endParaRPr lang="en-US"/>
           </a:p>
@@ -1655,7 +1655,7 @@
           <a:p>
             <a:fld id="{16828D75-A7DB-4752-86FD-E1CAE243E2A1}" type="datetimeFigureOut">
               <a:rPr lang="en-US" smtClean="0"/>
-              <a:t>3/10/2014</a:t>
+              <a:t>3/6/2014</a:t>
             </a:fld>
             <a:endParaRPr lang="en-US"/>
           </a:p>
@@ -2144,7 +2144,7 @@
           <a:p>
             <a:fld id="{16828D75-A7DB-4752-86FD-E1CAE243E2A1}" type="datetimeFigureOut">
               <a:rPr lang="en-US" smtClean="0"/>
-              <a:t>3/10/2014</a:t>
+              <a:t>3/6/2014</a:t>
             </a:fld>
             <a:endParaRPr lang="en-US"/>
           </a:p>
@@ -2270,7 +2270,7 @@
           <a:p>
             <a:fld id="{16828D75-A7DB-4752-86FD-E1CAE243E2A1}" type="datetimeFigureOut">
               <a:rPr lang="en-US" smtClean="0"/>
-              <a:t>3/10/2014</a:t>
+              <a:t>3/6/2014</a:t>
             </a:fld>
             <a:endParaRPr lang="en-US"/>
           </a:p>
@@ -2414,7 +2414,7 @@
           <a:p>
             <a:fld id="{16828D75-A7DB-4752-86FD-E1CAE243E2A1}" type="datetimeFigureOut">
               <a:rPr lang="en-US" smtClean="0"/>
-              <a:t>3/10/2014</a:t>
+              <a:t>3/6/2014</a:t>
             </a:fld>
             <a:endParaRPr lang="en-US"/>
           </a:p>
@@ -2736,7 +2736,7 @@
           <a:p>
             <a:fld id="{16828D75-A7DB-4752-86FD-E1CAE243E2A1}" type="datetimeFigureOut">
               <a:rPr lang="en-US" smtClean="0"/>
-              <a:t>3/10/2014</a:t>
+              <a:t>3/6/2014</a:t>
             </a:fld>
             <a:endParaRPr lang="en-US"/>
           </a:p>
@@ -2870,7 +2870,7 @@
           <a:p>
             <a:fld id="{16828D75-A7DB-4752-86FD-E1CAE243E2A1}" type="datetimeFigureOut">
               <a:rPr lang="en-US" smtClean="0"/>
-              <a:t>3/10/2014</a:t>
+              <a:t>3/6/2014</a:t>
             </a:fld>
             <a:endParaRPr lang="en-US"/>
           </a:p>
@@ -3651,7 +3651,7 @@
           <a:p>
             <a:fld id="{16828D75-A7DB-4752-86FD-E1CAE243E2A1}" type="datetimeFigureOut">
               <a:rPr lang="en-US" smtClean="0"/>
-              <a:t>3/10/2014</a:t>
+              <a:t>3/6/2014</a:t>
             </a:fld>
             <a:endParaRPr lang="en-US"/>
           </a:p>
@@ -4157,135 +4157,59 @@
             <p:ph type="ctrTitle"/>
           </p:nvPr>
         </p:nvSpPr>
-        <p:spPr>
-          <a:xfrm>
-            <a:off x="1432560" y="359898"/>
-            <a:ext cx="7406640" cy="2535702"/>
-          </a:xfrm>
-        </p:spPr>
+        <p:spPr/>
+        <p:txBody>
+          <a:bodyPr/>
+          <a:lstStyle/>
+          <a:p>
+            <a:r>
+              <a:rPr lang="en-US" dirty="0" smtClean="0"/>
+              <a:t>Data Race Detection</a:t>
+            </a:r>
+            <a:endParaRPr lang="en-US" dirty="0"/>
+          </a:p>
+        </p:txBody>
+      </p:sp>
+      <p:sp>
+        <p:nvSpPr>
+          <p:cNvPr id="3" name="Subtitle 2"/>
+          <p:cNvSpPr>
+            <a:spLocks noGrp="1"/>
+          </p:cNvSpPr>
+          <p:nvPr>
+            <p:ph type="subTitle" idx="1"/>
+          </p:nvPr>
+        </p:nvSpPr>
+        <p:spPr/>
         <p:txBody>
           <a:bodyPr>
-            <a:normAutofit/>
+            <a:normAutofit lnSpcReduction="10000"/>
           </a:bodyPr>
           <a:lstStyle/>
           <a:p>
             <a:r>
-              <a:rPr lang="en-US" sz="2800" dirty="0" err="1" smtClean="0">
-                <a:latin typeface="Arial" panose="020B0604020202020204" pitchFamily="34" charset="0"/>
-                <a:cs typeface="Arial" panose="020B0604020202020204" pitchFamily="34" charset="0"/>
-              </a:rPr>
-              <a:t>RoadRunner</a:t>
-            </a:r>
-            <a:r>
-              <a:rPr lang="en-US" sz="2800" dirty="0" smtClean="0">
-                <a:latin typeface="Arial" panose="020B0604020202020204" pitchFamily="34" charset="0"/>
-                <a:cs typeface="Arial" panose="020B0604020202020204" pitchFamily="34" charset="0"/>
-              </a:rPr>
-              <a:t> Dynamic Analysis Framework</a:t>
-            </a:r>
-            <a:endParaRPr lang="en-US" sz="2800" dirty="0">
-              <a:latin typeface="Arial" panose="020B0604020202020204" pitchFamily="34" charset="0"/>
-              <a:cs typeface="Arial" panose="020B0604020202020204" pitchFamily="34" charset="0"/>
-            </a:endParaRPr>
-          </a:p>
-        </p:txBody>
-      </p:sp>
-      <p:sp>
-        <p:nvSpPr>
-          <p:cNvPr id="3" name="Subtitle 2"/>
-          <p:cNvSpPr>
-            <a:spLocks noGrp="1"/>
-          </p:cNvSpPr>
-          <p:nvPr>
-            <p:ph type="subTitle" idx="1"/>
-          </p:nvPr>
-        </p:nvSpPr>
-        <p:spPr>
-          <a:xfrm>
-            <a:off x="1432560" y="4572000"/>
-            <a:ext cx="7406640" cy="2209800"/>
-          </a:xfrm>
-        </p:spPr>
-        <p:txBody>
-          <a:bodyPr>
-            <a:normAutofit/>
-          </a:bodyPr>
-          <a:lstStyle/>
-          <a:p>
-            <a:pPr algn="ctr"/>
-            <a:r>
-              <a:rPr lang="en-US" dirty="0" smtClean="0">
-                <a:latin typeface="Arial" panose="020B0604020202020204" pitchFamily="34" charset="0"/>
-                <a:cs typeface="Arial" panose="020B0604020202020204" pitchFamily="34" charset="0"/>
-              </a:rPr>
-              <a:t>Jonathan </a:t>
-            </a:r>
-            <a:r>
-              <a:rPr lang="en-US" dirty="0" smtClean="0">
-                <a:latin typeface="Arial" panose="020B0604020202020204" pitchFamily="34" charset="0"/>
-                <a:cs typeface="Arial" panose="020B0604020202020204" pitchFamily="34" charset="0"/>
-              </a:rPr>
-              <a:t>Chuc</a:t>
-            </a:r>
-          </a:p>
-          <a:p>
-            <a:pPr algn="ctr"/>
-            <a:r>
-              <a:rPr lang="en-US" dirty="0" err="1" smtClean="0">
-                <a:latin typeface="Arial" panose="020B0604020202020204" pitchFamily="34" charset="0"/>
-                <a:cs typeface="Arial" panose="020B0604020202020204" pitchFamily="34" charset="0"/>
-              </a:rPr>
-              <a:t>Duy</a:t>
-            </a:r>
-            <a:r>
-              <a:rPr lang="en-US" dirty="0" smtClean="0">
-                <a:latin typeface="Arial" panose="020B0604020202020204" pitchFamily="34" charset="0"/>
-                <a:cs typeface="Arial" panose="020B0604020202020204" pitchFamily="34" charset="0"/>
-              </a:rPr>
-              <a:t> Ho</a:t>
-            </a:r>
-          </a:p>
-          <a:p>
-            <a:pPr algn="ctr"/>
-            <a:r>
-              <a:rPr lang="en-US" dirty="0">
-                <a:latin typeface="Arial" panose="020B0604020202020204" pitchFamily="34" charset="0"/>
-                <a:cs typeface="Arial" panose="020B0604020202020204" pitchFamily="34" charset="0"/>
-              </a:rPr>
-              <a:t>Jay </a:t>
-            </a:r>
-            <a:r>
-              <a:rPr lang="en-US" dirty="0" smtClean="0">
-                <a:latin typeface="Arial" panose="020B0604020202020204" pitchFamily="34" charset="0"/>
-                <a:cs typeface="Arial" panose="020B0604020202020204" pitchFamily="34" charset="0"/>
-              </a:rPr>
-              <a:t>Jung</a:t>
-            </a:r>
-            <a:endParaRPr lang="en-US" dirty="0" smtClean="0">
-              <a:latin typeface="Arial" panose="020B0604020202020204" pitchFamily="34" charset="0"/>
-              <a:cs typeface="Arial" panose="020B0604020202020204" pitchFamily="34" charset="0"/>
-            </a:endParaRPr>
-          </a:p>
-          <a:p>
-            <a:pPr algn="ctr"/>
-            <a:r>
-              <a:rPr lang="en-US" dirty="0" smtClean="0">
-                <a:latin typeface="Arial" panose="020B0604020202020204" pitchFamily="34" charset="0"/>
-                <a:cs typeface="Arial" panose="020B0604020202020204" pitchFamily="34" charset="0"/>
-              </a:rPr>
-              <a:t>Curtis </a:t>
-            </a:r>
-            <a:r>
-              <a:rPr lang="en-US" dirty="0" smtClean="0">
-                <a:latin typeface="Arial" panose="020B0604020202020204" pitchFamily="34" charset="0"/>
-                <a:cs typeface="Arial" panose="020B0604020202020204" pitchFamily="34" charset="0"/>
-              </a:rPr>
-              <a:t>Lu</a:t>
-            </a:r>
-            <a:endParaRPr lang="en-US" dirty="0" smtClean="0">
-              <a:latin typeface="Arial" panose="020B0604020202020204" pitchFamily="34" charset="0"/>
-              <a:cs typeface="Arial" panose="020B0604020202020204" pitchFamily="34" charset="0"/>
-            </a:endParaRPr>
+              <a:rPr lang="en-US" dirty="0" smtClean="0"/>
+              <a:t>Jonathan Chuc</a:t>
+            </a:r>
+          </a:p>
+          <a:p>
+            <a:r>
+              <a:rPr lang="en-US" dirty="0" smtClean="0"/>
+              <a:t>Danny Ho</a:t>
+            </a:r>
+          </a:p>
+          <a:p>
+            <a:r>
+              <a:rPr lang="en-US" dirty="0" smtClean="0"/>
+              <a:t>Curtis Lu</a:t>
+            </a:r>
+          </a:p>
+          <a:p>
+            <a:r>
+              <a:rPr lang="en-US" dirty="0" smtClean="0"/>
+              <a:t>Jay Jung</a:t>
+            </a:r>
+            <a:endParaRPr lang="en-US" dirty="0"/>
           </a:p>
         </p:txBody>
       </p:sp>
@@ -4342,16 +4266,10 @@
           <a:lstStyle/>
           <a:p>
             <a:r>
-              <a:rPr lang="en-US" dirty="0" smtClean="0">
-                <a:latin typeface="Arial" panose="020B0604020202020204" pitchFamily="34" charset="0"/>
-                <a:cs typeface="Arial" panose="020B0604020202020204" pitchFamily="34" charset="0"/>
-              </a:rPr>
-              <a:t>What is Roadrunner?</a:t>
-            </a:r>
-            <a:endParaRPr lang="en-US" dirty="0">
-              <a:latin typeface="Arial" panose="020B0604020202020204" pitchFamily="34" charset="0"/>
-              <a:cs typeface="Arial" panose="020B0604020202020204" pitchFamily="34" charset="0"/>
-            </a:endParaRPr>
+              <a:rPr lang="en-US" dirty="0" smtClean="0"/>
+              <a:t>Data Race</a:t>
+            </a:r>
+            <a:endParaRPr lang="en-US" dirty="0"/>
           </a:p>
         </p:txBody>
       </p:sp>
@@ -4367,85 +4285,21 @@
         </p:nvSpPr>
         <p:spPr/>
         <p:txBody>
-          <a:bodyPr>
-            <a:normAutofit/>
-          </a:bodyPr>
+          <a:bodyPr/>
           <a:lstStyle/>
           <a:p>
             <a:r>
-              <a:rPr lang="en-US" sz="2000" dirty="0" smtClean="0">
-                <a:latin typeface="Arial" panose="020B0604020202020204" pitchFamily="34" charset="0"/>
-                <a:cs typeface="Arial" panose="020B0604020202020204" pitchFamily="34" charset="0"/>
-              </a:rPr>
-              <a:t>ROADRUNNER</a:t>
-            </a:r>
-            <a:r>
-              <a:rPr lang="en-US" sz="2000" dirty="0">
-                <a:latin typeface="Arial" panose="020B0604020202020204" pitchFamily="34" charset="0"/>
-                <a:cs typeface="Arial" panose="020B0604020202020204" pitchFamily="34" charset="0"/>
-              </a:rPr>
-              <a:t> </a:t>
-            </a:r>
-            <a:r>
-              <a:rPr lang="en-US" sz="2000" dirty="0" smtClean="0">
-                <a:latin typeface="Arial" panose="020B0604020202020204" pitchFamily="34" charset="0"/>
-                <a:cs typeface="Arial" panose="020B0604020202020204" pitchFamily="34" charset="0"/>
-              </a:rPr>
-              <a:t>is </a:t>
-            </a:r>
-            <a:r>
-              <a:rPr lang="en-US" sz="2000" dirty="0">
-                <a:latin typeface="Arial" panose="020B0604020202020204" pitchFamily="34" charset="0"/>
-                <a:cs typeface="Arial" panose="020B0604020202020204" pitchFamily="34" charset="0"/>
-              </a:rPr>
-              <a:t>a dynamic analysis framework designed to </a:t>
-            </a:r>
-            <a:r>
-              <a:rPr lang="en-US" sz="2000" dirty="0" smtClean="0">
-                <a:latin typeface="Arial" panose="020B0604020202020204" pitchFamily="34" charset="0"/>
-                <a:cs typeface="Arial" panose="020B0604020202020204" pitchFamily="34" charset="0"/>
-              </a:rPr>
-              <a:t>facilitate </a:t>
-            </a:r>
-            <a:r>
-              <a:rPr lang="en-US" sz="2000" dirty="0">
-                <a:latin typeface="Arial" panose="020B0604020202020204" pitchFamily="34" charset="0"/>
-                <a:cs typeface="Arial" panose="020B0604020202020204" pitchFamily="34" charset="0"/>
-              </a:rPr>
-              <a:t>rapid prototyping and experimentation with dynamic </a:t>
-            </a:r>
-            <a:r>
-              <a:rPr lang="en-US" sz="2000" dirty="0" smtClean="0">
-                <a:latin typeface="Arial" panose="020B0604020202020204" pitchFamily="34" charset="0"/>
-                <a:cs typeface="Arial" panose="020B0604020202020204" pitchFamily="34" charset="0"/>
-              </a:rPr>
-              <a:t>analyses for </a:t>
-            </a:r>
-            <a:r>
-              <a:rPr lang="en-US" sz="2000" dirty="0">
-                <a:latin typeface="Arial" panose="020B0604020202020204" pitchFamily="34" charset="0"/>
-                <a:cs typeface="Arial" panose="020B0604020202020204" pitchFamily="34" charset="0"/>
-              </a:rPr>
-              <a:t>concurrent Java programs</a:t>
-            </a:r>
-            <a:r>
-              <a:rPr lang="en-US" sz="2000" dirty="0" smtClean="0">
-                <a:latin typeface="Arial" panose="020B0604020202020204" pitchFamily="34" charset="0"/>
-                <a:cs typeface="Arial" panose="020B0604020202020204" pitchFamily="34" charset="0"/>
-              </a:rPr>
-              <a:t>.</a:t>
-            </a:r>
-            <a:endParaRPr lang="en-US" sz="2000" dirty="0">
-              <a:latin typeface="Arial" panose="020B0604020202020204" pitchFamily="34" charset="0"/>
-              <a:cs typeface="Arial" panose="020B0604020202020204" pitchFamily="34" charset="0"/>
-            </a:endParaRPr>
+              <a:rPr lang="en-US" dirty="0" smtClean="0"/>
+              <a:t>-insert basic definition of data race here + code/picture example of a data race-</a:t>
+            </a:r>
+            <a:endParaRPr lang="en-US" dirty="0"/>
           </a:p>
         </p:txBody>
       </p:sp>
     </p:spTree>
     <p:extLst>
       <p:ext uri="{BB962C8B-B14F-4D97-AF65-F5344CB8AC3E}">
-        <p14:creationId xmlns:p14="http://schemas.microsoft.com/office/powerpoint/2010/main" val="1936923114"/>
+        <p14:creationId xmlns:p14="http://schemas.microsoft.com/office/powerpoint/2010/main" val="1395757819"/>
       </p:ext>
     </p:extLst>
   </p:cSld>
@@ -4495,16 +4349,10 @@
           <a:lstStyle/>
           <a:p>
             <a:r>
-              <a:rPr lang="en-US" dirty="0" smtClean="0">
-                <a:latin typeface="Arial" panose="020B0604020202020204" pitchFamily="34" charset="0"/>
-                <a:cs typeface="Arial" panose="020B0604020202020204" pitchFamily="34" charset="0"/>
-              </a:rPr>
-              <a:t>What is a data race?</a:t>
-            </a:r>
-            <a:endParaRPr lang="en-US" dirty="0">
-              <a:latin typeface="Arial" panose="020B0604020202020204" pitchFamily="34" charset="0"/>
-              <a:cs typeface="Arial" panose="020B0604020202020204" pitchFamily="34" charset="0"/>
-            </a:endParaRPr>
+              <a:rPr lang="en-US" dirty="0" smtClean="0"/>
+              <a:t>Roadrunner</a:t>
+            </a:r>
+            <a:endParaRPr lang="en-US" dirty="0"/>
           </a:p>
         </p:txBody>
       </p:sp>
@@ -4518,890 +4366,45 @@
             <p:ph idx="1"/>
           </p:nvPr>
         </p:nvSpPr>
-        <p:spPr>
-          <a:xfrm>
-            <a:off x="1435608" y="1447800"/>
-            <a:ext cx="7498080" cy="2133600"/>
-          </a:xfrm>
-        </p:spPr>
-        <p:txBody>
-          <a:bodyPr>
-            <a:normAutofit/>
-          </a:bodyPr>
+        <p:spPr/>
+        <p:txBody>
+          <a:bodyPr/>
           <a:lstStyle/>
           <a:p>
             <a:r>
-              <a:rPr lang="en-US" sz="2000" dirty="0">
-                <a:latin typeface="Arial" panose="020B0604020202020204" pitchFamily="34" charset="0"/>
-                <a:cs typeface="Arial" panose="020B0604020202020204" pitchFamily="34" charset="0"/>
-              </a:rPr>
-              <a:t>A race condition or race hazard is the behavior of an electronic or software system where the output is dependent on the sequence or timing of other uncontrollable events. It becomes a bug when events do not happen in the order the programmer intended. The term originates with the idea of two signals racing each other to influence the output first.</a:t>
-            </a:r>
-            <a:endParaRPr lang="en-US" sz="2000" dirty="0">
-              <a:latin typeface="Arial" panose="020B0604020202020204" pitchFamily="34" charset="0"/>
-              <a:cs typeface="Arial" panose="020B0604020202020204" pitchFamily="34" charset="0"/>
-            </a:endParaRPr>
-          </a:p>
-        </p:txBody>
-      </p:sp>
-      <p:graphicFrame>
-        <p:nvGraphicFramePr>
-          <p:cNvPr id="4" name="Table 3"/>
-          <p:cNvGraphicFramePr>
-            <a:graphicFrameLocks noGrp="1"/>
-          </p:cNvGraphicFramePr>
-          <p:nvPr>
-            <p:extLst>
-              <p:ext uri="{D42A27DB-BD31-4B8C-83A1-F6EECF244321}">
-                <p14:modId xmlns:p14="http://schemas.microsoft.com/office/powerpoint/2010/main" val="114189713"/>
-              </p:ext>
-            </p:extLst>
-          </p:nvPr>
-        </p:nvGraphicFramePr>
-        <p:xfrm>
-          <a:off x="1371600" y="3733800"/>
-          <a:ext cx="7499348" cy="2926080"/>
-        </p:xfrm>
-        <a:graphic>
-          <a:graphicData uri="http://schemas.openxmlformats.org/drawingml/2006/table">
-            <a:tbl>
-              <a:tblPr/>
-              <a:tblGrid>
-                <a:gridCol w="1874837"/>
-                <a:gridCol w="1874837"/>
-                <a:gridCol w="1874837"/>
-                <a:gridCol w="1874837"/>
-              </a:tblGrid>
-              <a:tr h="365760">
-                <a:tc>
-                  <a:txBody>
-                    <a:bodyPr/>
-                    <a:lstStyle/>
-                    <a:p>
-                      <a:r>
-                        <a:rPr lang="en-US" sz="1800" dirty="0"/>
-                        <a:t>Thread 1</a:t>
-                      </a:r>
-                    </a:p>
-                  </a:txBody>
-                  <a:tcPr anchor="ctr">
-                    <a:lnL>
-                      <a:noFill/>
-                    </a:lnL>
-                    <a:lnR>
-                      <a:noFill/>
-                    </a:lnR>
-                    <a:lnT>
-                      <a:noFill/>
-                    </a:lnT>
-                    <a:lnB>
-                      <a:noFill/>
-                    </a:lnB>
-                  </a:tcPr>
-                </a:tc>
-                <a:tc>
-                  <a:txBody>
-                    <a:bodyPr/>
-                    <a:lstStyle/>
-                    <a:p>
-                      <a:r>
-                        <a:rPr lang="en-US" sz="1800" dirty="0"/>
-                        <a:t>Thread 2</a:t>
-                      </a:r>
-                    </a:p>
-                  </a:txBody>
-                  <a:tcPr anchor="ctr">
-                    <a:lnL>
-                      <a:noFill/>
-                    </a:lnL>
-                    <a:lnR>
-                      <a:noFill/>
-                    </a:lnR>
-                    <a:lnT>
-                      <a:noFill/>
-                    </a:lnT>
-                    <a:lnB>
-                      <a:noFill/>
-                    </a:lnB>
-                  </a:tcPr>
-                </a:tc>
-                <a:tc>
-                  <a:txBody>
-                    <a:bodyPr/>
-                    <a:lstStyle/>
-                    <a:p>
-                      <a:endParaRPr lang="en-US" sz="1800"/>
-                    </a:p>
-                  </a:txBody>
-                  <a:tcPr anchor="ctr">
-                    <a:lnL>
-                      <a:noFill/>
-                    </a:lnL>
-                    <a:lnR>
-                      <a:noFill/>
-                    </a:lnR>
-                    <a:lnT>
-                      <a:noFill/>
-                    </a:lnT>
-                    <a:lnB>
-                      <a:noFill/>
-                    </a:lnB>
-                  </a:tcPr>
-                </a:tc>
-                <a:tc>
-                  <a:txBody>
-                    <a:bodyPr/>
-                    <a:lstStyle/>
-                    <a:p>
-                      <a:r>
-                        <a:rPr lang="en-US" sz="1800"/>
-                        <a:t>Integer value</a:t>
-                      </a:r>
-                    </a:p>
-                  </a:txBody>
-                  <a:tcPr anchor="ctr">
-                    <a:lnL>
-                      <a:noFill/>
-                    </a:lnL>
-                    <a:lnR>
-                      <a:noFill/>
-                    </a:lnR>
-                    <a:lnT>
-                      <a:noFill/>
-                    </a:lnT>
-                    <a:lnB>
-                      <a:noFill/>
-                    </a:lnB>
-                  </a:tcPr>
-                </a:tc>
-              </a:tr>
-              <a:tr h="365760">
-                <a:tc>
-                  <a:txBody>
-                    <a:bodyPr/>
-                    <a:lstStyle/>
-                    <a:p>
-                      <a:endParaRPr lang="en-US" sz="1800" dirty="0"/>
-                    </a:p>
-                  </a:txBody>
-                  <a:tcPr anchor="ctr">
-                    <a:lnL>
-                      <a:noFill/>
-                    </a:lnL>
-                    <a:lnR>
-                      <a:noFill/>
-                    </a:lnR>
-                    <a:lnT>
-                      <a:noFill/>
-                    </a:lnT>
-                    <a:lnB>
-                      <a:noFill/>
-                    </a:lnB>
-                  </a:tcPr>
-                </a:tc>
-                <a:tc>
-                  <a:txBody>
-                    <a:bodyPr/>
-                    <a:lstStyle/>
-                    <a:p>
-                      <a:endParaRPr lang="en-US" sz="1800" dirty="0"/>
-                    </a:p>
-                  </a:txBody>
-                  <a:tcPr anchor="ctr">
-                    <a:lnL>
-                      <a:noFill/>
-                    </a:lnL>
-                    <a:lnR>
-                      <a:noFill/>
-                    </a:lnR>
-                    <a:lnT>
-                      <a:noFill/>
-                    </a:lnT>
-                    <a:lnB>
-                      <a:noFill/>
-                    </a:lnB>
-                  </a:tcPr>
-                </a:tc>
-                <a:tc>
-                  <a:txBody>
-                    <a:bodyPr/>
-                    <a:lstStyle/>
-                    <a:p>
-                      <a:endParaRPr lang="en-US" sz="1800"/>
-                    </a:p>
-                  </a:txBody>
-                  <a:tcPr anchor="ctr">
-                    <a:lnL>
-                      <a:noFill/>
-                    </a:lnL>
-                    <a:lnR>
-                      <a:noFill/>
-                    </a:lnR>
-                    <a:lnT>
-                      <a:noFill/>
-                    </a:lnT>
-                    <a:lnB>
-                      <a:noFill/>
-                    </a:lnB>
-                  </a:tcPr>
-                </a:tc>
-                <a:tc>
-                  <a:txBody>
-                    <a:bodyPr/>
-                    <a:lstStyle/>
-                    <a:p>
-                      <a:r>
-                        <a:rPr lang="en-US" sz="1800"/>
-                        <a:t>0</a:t>
-                      </a:r>
-                    </a:p>
-                  </a:txBody>
-                  <a:tcPr anchor="ctr">
-                    <a:lnL>
-                      <a:noFill/>
-                    </a:lnL>
-                    <a:lnR>
-                      <a:noFill/>
-                    </a:lnR>
-                    <a:lnT>
-                      <a:noFill/>
-                    </a:lnT>
-                    <a:lnB>
-                      <a:noFill/>
-                    </a:lnB>
-                  </a:tcPr>
-                </a:tc>
-              </a:tr>
-              <a:tr h="365760">
-                <a:tc>
-                  <a:txBody>
-                    <a:bodyPr/>
-                    <a:lstStyle/>
-                    <a:p>
-                      <a:r>
-                        <a:rPr lang="en-US" sz="1800"/>
-                        <a:t>read value</a:t>
-                      </a:r>
-                    </a:p>
-                  </a:txBody>
-                  <a:tcPr anchor="ctr">
-                    <a:lnL>
-                      <a:noFill/>
-                    </a:lnL>
-                    <a:lnR>
-                      <a:noFill/>
-                    </a:lnR>
-                    <a:lnT>
-                      <a:noFill/>
-                    </a:lnT>
-                    <a:lnB>
-                      <a:noFill/>
-                    </a:lnB>
-                  </a:tcPr>
-                </a:tc>
-                <a:tc>
-                  <a:txBody>
-                    <a:bodyPr/>
-                    <a:lstStyle/>
-                    <a:p>
-                      <a:endParaRPr lang="en-US" sz="1800" dirty="0"/>
-                    </a:p>
-                  </a:txBody>
-                  <a:tcPr anchor="ctr">
-                    <a:lnL>
-                      <a:noFill/>
-                    </a:lnL>
-                    <a:lnR>
-                      <a:noFill/>
-                    </a:lnR>
-                    <a:lnT>
-                      <a:noFill/>
-                    </a:lnT>
-                    <a:lnB>
-                      <a:noFill/>
-                    </a:lnB>
-                  </a:tcPr>
-                </a:tc>
-                <a:tc>
-                  <a:txBody>
-                    <a:bodyPr/>
-                    <a:lstStyle/>
-                    <a:p>
-                      <a:r>
-                        <a:rPr lang="en-US" sz="1800"/>
-                        <a:t>←</a:t>
-                      </a:r>
-                    </a:p>
-                  </a:txBody>
-                  <a:tcPr anchor="ctr">
-                    <a:lnL>
-                      <a:noFill/>
-                    </a:lnL>
-                    <a:lnR>
-                      <a:noFill/>
-                    </a:lnR>
-                    <a:lnT>
-                      <a:noFill/>
-                    </a:lnT>
-                    <a:lnB>
-                      <a:noFill/>
-                    </a:lnB>
-                  </a:tcPr>
-                </a:tc>
-                <a:tc>
-                  <a:txBody>
-                    <a:bodyPr/>
-                    <a:lstStyle/>
-                    <a:p>
-                      <a:r>
-                        <a:rPr lang="en-US" sz="1800"/>
-                        <a:t>0</a:t>
-                      </a:r>
-                    </a:p>
-                  </a:txBody>
-                  <a:tcPr anchor="ctr">
-                    <a:lnL>
-                      <a:noFill/>
-                    </a:lnL>
-                    <a:lnR>
-                      <a:noFill/>
-                    </a:lnR>
-                    <a:lnT>
-                      <a:noFill/>
-                    </a:lnT>
-                    <a:lnB>
-                      <a:noFill/>
-                    </a:lnB>
-                  </a:tcPr>
-                </a:tc>
-              </a:tr>
-              <a:tr h="365760">
-                <a:tc>
-                  <a:txBody>
-                    <a:bodyPr/>
-                    <a:lstStyle/>
-                    <a:p>
-                      <a:endParaRPr lang="en-US" sz="1800"/>
-                    </a:p>
-                  </a:txBody>
-                  <a:tcPr anchor="ctr">
-                    <a:lnL>
-                      <a:noFill/>
-                    </a:lnL>
-                    <a:lnR>
-                      <a:noFill/>
-                    </a:lnR>
-                    <a:lnT>
-                      <a:noFill/>
-                    </a:lnT>
-                    <a:lnB>
-                      <a:noFill/>
-                    </a:lnB>
-                  </a:tcPr>
-                </a:tc>
-                <a:tc>
-                  <a:txBody>
-                    <a:bodyPr/>
-                    <a:lstStyle/>
-                    <a:p>
-                      <a:r>
-                        <a:rPr lang="en-US" sz="1800"/>
-                        <a:t>read value</a:t>
-                      </a:r>
-                    </a:p>
-                  </a:txBody>
-                  <a:tcPr anchor="ctr">
-                    <a:lnL>
-                      <a:noFill/>
-                    </a:lnL>
-                    <a:lnR>
-                      <a:noFill/>
-                    </a:lnR>
-                    <a:lnT>
-                      <a:noFill/>
-                    </a:lnT>
-                    <a:lnB>
-                      <a:noFill/>
-                    </a:lnB>
-                  </a:tcPr>
-                </a:tc>
-                <a:tc>
-                  <a:txBody>
-                    <a:bodyPr/>
-                    <a:lstStyle/>
-                    <a:p>
-                      <a:r>
-                        <a:rPr lang="en-US" sz="1800"/>
-                        <a:t>←</a:t>
-                      </a:r>
-                    </a:p>
-                  </a:txBody>
-                  <a:tcPr anchor="ctr">
-                    <a:lnL>
-                      <a:noFill/>
-                    </a:lnL>
-                    <a:lnR>
-                      <a:noFill/>
-                    </a:lnR>
-                    <a:lnT>
-                      <a:noFill/>
-                    </a:lnT>
-                    <a:lnB>
-                      <a:noFill/>
-                    </a:lnB>
-                  </a:tcPr>
-                </a:tc>
-                <a:tc>
-                  <a:txBody>
-                    <a:bodyPr/>
-                    <a:lstStyle/>
-                    <a:p>
-                      <a:r>
-                        <a:rPr lang="en-US" sz="1800"/>
-                        <a:t>0</a:t>
-                      </a:r>
-                    </a:p>
-                  </a:txBody>
-                  <a:tcPr anchor="ctr">
-                    <a:lnL>
-                      <a:noFill/>
-                    </a:lnL>
-                    <a:lnR>
-                      <a:noFill/>
-                    </a:lnR>
-                    <a:lnT>
-                      <a:noFill/>
-                    </a:lnT>
-                    <a:lnB>
-                      <a:noFill/>
-                    </a:lnB>
-                  </a:tcPr>
-                </a:tc>
-              </a:tr>
-              <a:tr h="365760">
-                <a:tc>
-                  <a:txBody>
-                    <a:bodyPr/>
-                    <a:lstStyle/>
-                    <a:p>
-                      <a:r>
-                        <a:rPr lang="en-US" sz="1800">
-                          <a:effectLst/>
-                        </a:rPr>
-                        <a:t>increase value</a:t>
-                      </a:r>
-                    </a:p>
-                  </a:txBody>
-                  <a:tcPr anchor="ctr">
-                    <a:lnL>
-                      <a:noFill/>
-                    </a:lnL>
-                    <a:lnR>
-                      <a:noFill/>
-                    </a:lnR>
-                    <a:lnT>
-                      <a:noFill/>
-                    </a:lnT>
-                    <a:lnB>
-                      <a:noFill/>
-                    </a:lnB>
-                    <a:solidFill>
-                      <a:srgbClr val="F5DEB3"/>
-                    </a:solidFill>
-                  </a:tcPr>
-                </a:tc>
-                <a:tc>
-                  <a:txBody>
-                    <a:bodyPr/>
-                    <a:lstStyle/>
-                    <a:p>
-                      <a:endParaRPr lang="en-US" sz="1800"/>
-                    </a:p>
-                  </a:txBody>
-                  <a:tcPr anchor="ctr">
-                    <a:lnL>
-                      <a:noFill/>
-                    </a:lnL>
-                    <a:lnR>
-                      <a:noFill/>
-                    </a:lnR>
-                    <a:lnT>
-                      <a:noFill/>
-                    </a:lnT>
-                    <a:lnB>
-                      <a:noFill/>
-                    </a:lnB>
-                  </a:tcPr>
-                </a:tc>
-                <a:tc>
-                  <a:txBody>
-                    <a:bodyPr/>
-                    <a:lstStyle/>
-                    <a:p>
-                      <a:endParaRPr lang="en-US" sz="1800"/>
-                    </a:p>
-                  </a:txBody>
-                  <a:tcPr anchor="ctr">
-                    <a:lnL>
-                      <a:noFill/>
-                    </a:lnL>
-                    <a:lnR>
-                      <a:noFill/>
-                    </a:lnR>
-                    <a:lnT>
-                      <a:noFill/>
-                    </a:lnT>
-                    <a:lnB>
-                      <a:noFill/>
-                    </a:lnB>
-                  </a:tcPr>
-                </a:tc>
-                <a:tc>
-                  <a:txBody>
-                    <a:bodyPr/>
-                    <a:lstStyle/>
-                    <a:p>
-                      <a:r>
-                        <a:rPr lang="en-US" sz="1800"/>
-                        <a:t>0</a:t>
-                      </a:r>
-                    </a:p>
-                  </a:txBody>
-                  <a:tcPr anchor="ctr">
-                    <a:lnL>
-                      <a:noFill/>
-                    </a:lnL>
-                    <a:lnR>
-                      <a:noFill/>
-                    </a:lnR>
-                    <a:lnT>
-                      <a:noFill/>
-                    </a:lnT>
-                    <a:lnB>
-                      <a:noFill/>
-                    </a:lnB>
-                  </a:tcPr>
-                </a:tc>
-              </a:tr>
-              <a:tr h="365760">
-                <a:tc>
-                  <a:txBody>
-                    <a:bodyPr/>
-                    <a:lstStyle/>
-                    <a:p>
-                      <a:endParaRPr lang="en-US" sz="1800"/>
-                    </a:p>
-                  </a:txBody>
-                  <a:tcPr anchor="ctr">
-                    <a:lnL>
-                      <a:noFill/>
-                    </a:lnL>
-                    <a:lnR>
-                      <a:noFill/>
-                    </a:lnR>
-                    <a:lnT>
-                      <a:noFill/>
-                    </a:lnT>
-                    <a:lnB>
-                      <a:noFill/>
-                    </a:lnB>
-                  </a:tcPr>
-                </a:tc>
-                <a:tc>
-                  <a:txBody>
-                    <a:bodyPr/>
-                    <a:lstStyle/>
-                    <a:p>
-                      <a:r>
-                        <a:rPr lang="en-US" sz="1800">
-                          <a:effectLst/>
-                        </a:rPr>
-                        <a:t>increase value</a:t>
-                      </a:r>
-                    </a:p>
-                  </a:txBody>
-                  <a:tcPr anchor="ctr">
-                    <a:lnL>
-                      <a:noFill/>
-                    </a:lnL>
-                    <a:lnR>
-                      <a:noFill/>
-                    </a:lnR>
-                    <a:lnT>
-                      <a:noFill/>
-                    </a:lnT>
-                    <a:lnB>
-                      <a:noFill/>
-                    </a:lnB>
-                    <a:solidFill>
-                      <a:srgbClr val="F5DEB3"/>
-                    </a:solidFill>
-                  </a:tcPr>
-                </a:tc>
-                <a:tc>
-                  <a:txBody>
-                    <a:bodyPr/>
-                    <a:lstStyle/>
-                    <a:p>
-                      <a:endParaRPr lang="en-US" sz="1800" dirty="0"/>
-                    </a:p>
-                  </a:txBody>
-                  <a:tcPr anchor="ctr">
-                    <a:lnL>
-                      <a:noFill/>
-                    </a:lnL>
-                    <a:lnR>
-                      <a:noFill/>
-                    </a:lnR>
-                    <a:lnT>
-                      <a:noFill/>
-                    </a:lnT>
-                    <a:lnB>
-                      <a:noFill/>
-                    </a:lnB>
-                  </a:tcPr>
-                </a:tc>
-                <a:tc>
-                  <a:txBody>
-                    <a:bodyPr/>
-                    <a:lstStyle/>
-                    <a:p>
-                      <a:r>
-                        <a:rPr lang="en-US" sz="1800"/>
-                        <a:t>0</a:t>
-                      </a:r>
-                    </a:p>
-                  </a:txBody>
-                  <a:tcPr anchor="ctr">
-                    <a:lnL>
-                      <a:noFill/>
-                    </a:lnL>
-                    <a:lnR>
-                      <a:noFill/>
-                    </a:lnR>
-                    <a:lnT>
-                      <a:noFill/>
-                    </a:lnT>
-                    <a:lnB>
-                      <a:noFill/>
-                    </a:lnB>
-                  </a:tcPr>
-                </a:tc>
-              </a:tr>
-              <a:tr h="365760">
-                <a:tc>
-                  <a:txBody>
-                    <a:bodyPr/>
-                    <a:lstStyle/>
-                    <a:p>
-                      <a:r>
-                        <a:rPr lang="en-US" sz="1800"/>
-                        <a:t>write back</a:t>
-                      </a:r>
-                    </a:p>
-                  </a:txBody>
-                  <a:tcPr anchor="ctr">
-                    <a:lnL>
-                      <a:noFill/>
-                    </a:lnL>
-                    <a:lnR>
-                      <a:noFill/>
-                    </a:lnR>
-                    <a:lnT>
-                      <a:noFill/>
-                    </a:lnT>
-                    <a:lnB>
-                      <a:noFill/>
-                    </a:lnB>
-                  </a:tcPr>
-                </a:tc>
-                <a:tc>
-                  <a:txBody>
-                    <a:bodyPr/>
-                    <a:lstStyle/>
-                    <a:p>
-                      <a:endParaRPr lang="en-US" sz="1800"/>
-                    </a:p>
-                  </a:txBody>
-                  <a:tcPr anchor="ctr">
-                    <a:lnL>
-                      <a:noFill/>
-                    </a:lnL>
-                    <a:lnR>
-                      <a:noFill/>
-                    </a:lnR>
-                    <a:lnT>
-                      <a:noFill/>
-                    </a:lnT>
-                    <a:lnB>
-                      <a:noFill/>
-                    </a:lnB>
-                  </a:tcPr>
-                </a:tc>
-                <a:tc>
-                  <a:txBody>
-                    <a:bodyPr/>
-                    <a:lstStyle/>
-                    <a:p>
-                      <a:r>
-                        <a:rPr lang="en-US" sz="1800"/>
-                        <a:t>→</a:t>
-                      </a:r>
-                    </a:p>
-                  </a:txBody>
-                  <a:tcPr anchor="ctr">
-                    <a:lnL>
-                      <a:noFill/>
-                    </a:lnL>
-                    <a:lnR>
-                      <a:noFill/>
-                    </a:lnR>
-                    <a:lnT>
-                      <a:noFill/>
-                    </a:lnT>
-                    <a:lnB>
-                      <a:noFill/>
-                    </a:lnB>
-                  </a:tcPr>
-                </a:tc>
-                <a:tc>
-                  <a:txBody>
-                    <a:bodyPr/>
-                    <a:lstStyle/>
-                    <a:p>
-                      <a:r>
-                        <a:rPr lang="en-US" sz="1800"/>
-                        <a:t>1</a:t>
-                      </a:r>
-                    </a:p>
-                  </a:txBody>
-                  <a:tcPr anchor="ctr">
-                    <a:lnL>
-                      <a:noFill/>
-                    </a:lnL>
-                    <a:lnR>
-                      <a:noFill/>
-                    </a:lnR>
-                    <a:lnT>
-                      <a:noFill/>
-                    </a:lnT>
-                    <a:lnB>
-                      <a:noFill/>
-                    </a:lnB>
-                  </a:tcPr>
-                </a:tc>
-              </a:tr>
-              <a:tr h="365760">
-                <a:tc>
-                  <a:txBody>
-                    <a:bodyPr/>
-                    <a:lstStyle/>
-                    <a:p>
-                      <a:endParaRPr lang="en-US" sz="1800"/>
-                    </a:p>
-                  </a:txBody>
-                  <a:tcPr anchor="ctr">
-                    <a:lnL>
-                      <a:noFill/>
-                    </a:lnL>
-                    <a:lnR>
-                      <a:noFill/>
-                    </a:lnR>
-                    <a:lnT>
-                      <a:noFill/>
-                    </a:lnT>
-                    <a:lnB>
-                      <a:noFill/>
-                    </a:lnB>
-                  </a:tcPr>
-                </a:tc>
-                <a:tc>
-                  <a:txBody>
-                    <a:bodyPr/>
-                    <a:lstStyle/>
-                    <a:p>
-                      <a:r>
-                        <a:rPr lang="en-US" sz="1800"/>
-                        <a:t>write back</a:t>
-                      </a:r>
-                    </a:p>
-                  </a:txBody>
-                  <a:tcPr anchor="ctr">
-                    <a:lnL>
-                      <a:noFill/>
-                    </a:lnL>
-                    <a:lnR>
-                      <a:noFill/>
-                    </a:lnR>
-                    <a:lnT>
-                      <a:noFill/>
-                    </a:lnT>
-                    <a:lnB>
-                      <a:noFill/>
-                    </a:lnB>
-                  </a:tcPr>
-                </a:tc>
-                <a:tc>
-                  <a:txBody>
-                    <a:bodyPr/>
-                    <a:lstStyle/>
-                    <a:p>
-                      <a:r>
-                        <a:rPr lang="en-US" sz="1800"/>
-                        <a:t>→</a:t>
-                      </a:r>
-                    </a:p>
-                  </a:txBody>
-                  <a:tcPr anchor="ctr">
-                    <a:lnL>
-                      <a:noFill/>
-                    </a:lnL>
-                    <a:lnR>
-                      <a:noFill/>
-                    </a:lnR>
-                    <a:lnT>
-                      <a:noFill/>
-                    </a:lnT>
-                    <a:lnB>
-                      <a:noFill/>
-                    </a:lnB>
-                  </a:tcPr>
-                </a:tc>
-                <a:tc>
-                  <a:txBody>
-                    <a:bodyPr/>
-                    <a:lstStyle/>
-                    <a:p>
-                      <a:r>
-                        <a:rPr lang="en-US" sz="1800" dirty="0"/>
-                        <a:t>1</a:t>
-                      </a:r>
-                    </a:p>
-                  </a:txBody>
-                  <a:tcPr anchor="ctr">
-                    <a:lnL>
-                      <a:noFill/>
-                    </a:lnL>
-                    <a:lnR>
-                      <a:noFill/>
-                    </a:lnR>
-                    <a:lnT>
-                      <a:noFill/>
-                    </a:lnT>
-                    <a:lnB>
-                      <a:noFill/>
-                    </a:lnB>
-                  </a:tcPr>
-                </a:tc>
-              </a:tr>
-            </a:tbl>
-          </a:graphicData>
-        </a:graphic>
-      </p:graphicFrame>
+              <a:rPr lang="en-US" dirty="0" smtClean="0"/>
+              <a:t>Dynamic analysis framework, allows you to run multiple tools at the same time.</a:t>
+            </a:r>
+          </a:p>
+          <a:p>
+            <a:r>
+              <a:rPr lang="en-US" dirty="0" err="1" smtClean="0"/>
+              <a:t>LockSet</a:t>
+            </a:r>
+            <a:r>
+              <a:rPr lang="en-US" dirty="0" smtClean="0"/>
+              <a:t>, </a:t>
+            </a:r>
+            <a:r>
+              <a:rPr lang="en-US" dirty="0" err="1" smtClean="0"/>
+              <a:t>FastTrack</a:t>
+            </a:r>
+            <a:r>
+              <a:rPr lang="en-US" dirty="0" smtClean="0"/>
+              <a:t>, Atomizer, Eraser, </a:t>
+            </a:r>
+            <a:r>
+              <a:rPr lang="en-US" dirty="0" err="1" smtClean="0"/>
+              <a:t>HappensBefore</a:t>
+            </a:r>
+            <a:endParaRPr lang="en-US" dirty="0" smtClean="0"/>
+          </a:p>
+        </p:txBody>
+      </p:sp>
     </p:spTree>
     <p:extLst>
       <p:ext uri="{BB962C8B-B14F-4D97-AF65-F5344CB8AC3E}">
-        <p14:creationId xmlns:p14="http://schemas.microsoft.com/office/powerpoint/2010/main" val="1395757819"/>
+        <p14:creationId xmlns:p14="http://schemas.microsoft.com/office/powerpoint/2010/main" val="1936923114"/>
       </p:ext>
     </p:extLst>
   </p:cSld>
@@ -5451,30 +4454,10 @@
           <a:lstStyle/>
           <a:p>
             <a:r>
-              <a:rPr lang="en-US" dirty="0" smtClean="0">
-                <a:latin typeface="Arial" panose="020B0604020202020204" pitchFamily="34" charset="0"/>
-                <a:cs typeface="Arial" panose="020B0604020202020204" pitchFamily="34" charset="0"/>
-              </a:rPr>
-              <a:t>Strengths </a:t>
-            </a:r>
-            <a:r>
-              <a:rPr lang="en-US" dirty="0">
-                <a:latin typeface="Arial" panose="020B0604020202020204" pitchFamily="34" charset="0"/>
-                <a:cs typeface="Arial" panose="020B0604020202020204" pitchFamily="34" charset="0"/>
-              </a:rPr>
-              <a:t>of </a:t>
-            </a:r>
-            <a:r>
-              <a:rPr lang="en-US" dirty="0" err="1">
-                <a:latin typeface="Arial" panose="020B0604020202020204" pitchFamily="34" charset="0"/>
-                <a:cs typeface="Arial" panose="020B0604020202020204" pitchFamily="34" charset="0"/>
-              </a:rPr>
-              <a:t>RoadRunner</a:t>
-            </a:r>
-            <a:endParaRPr lang="en-US" dirty="0">
-              <a:latin typeface="Arial" panose="020B0604020202020204" pitchFamily="34" charset="0"/>
-              <a:cs typeface="Arial" panose="020B0604020202020204" pitchFamily="34" charset="0"/>
-            </a:endParaRPr>
+              <a:rPr lang="en-US" dirty="0" smtClean="0"/>
+              <a:t>Strengths</a:t>
+            </a:r>
+            <a:endParaRPr lang="en-US" dirty="0"/>
           </a:p>
         </p:txBody>
       </p:sp>
@@ -5488,132 +4471,19 @@
             <p:ph idx="1"/>
           </p:nvPr>
         </p:nvSpPr>
-        <p:spPr>
-          <a:xfrm>
-            <a:off x="1435608" y="1447800"/>
-            <a:ext cx="7498080" cy="5181600"/>
-          </a:xfrm>
-        </p:spPr>
-        <p:txBody>
-          <a:bodyPr>
-            <a:normAutofit fontScale="70000" lnSpcReduction="20000"/>
-          </a:bodyPr>
+        <p:spPr/>
+        <p:txBody>
+          <a:bodyPr/>
           <a:lstStyle/>
           <a:p>
-            <a:r>
-              <a:rPr lang="en-US" dirty="0" smtClean="0">
-                <a:latin typeface="Arial" panose="020B0604020202020204" pitchFamily="34" charset="0"/>
-                <a:cs typeface="Arial" panose="020B0604020202020204" pitchFamily="34" charset="0"/>
-              </a:rPr>
-              <a:t>Flexible and robust</a:t>
-            </a:r>
-            <a:endParaRPr lang="en-US" dirty="0">
-              <a:latin typeface="Arial" panose="020B0604020202020204" pitchFamily="34" charset="0"/>
-              <a:cs typeface="Arial" panose="020B0604020202020204" pitchFamily="34" charset="0"/>
-            </a:endParaRPr>
-          </a:p>
-          <a:p>
-            <a:r>
-              <a:rPr lang="en-US" dirty="0" smtClean="0">
-                <a:latin typeface="Arial" panose="020B0604020202020204" pitchFamily="34" charset="0"/>
-                <a:cs typeface="Arial" panose="020B0604020202020204" pitchFamily="34" charset="0"/>
-              </a:rPr>
-              <a:t>Reduces </a:t>
-            </a:r>
-            <a:r>
-              <a:rPr lang="en-US" dirty="0">
-                <a:latin typeface="Arial" panose="020B0604020202020204" pitchFamily="34" charset="0"/>
-                <a:cs typeface="Arial" panose="020B0604020202020204" pitchFamily="34" charset="0"/>
-              </a:rPr>
-              <a:t>overhead on implementing dynamic analyses</a:t>
-            </a:r>
-          </a:p>
-          <a:p>
-            <a:r>
-              <a:rPr lang="en-US" dirty="0" smtClean="0">
-                <a:latin typeface="Arial" panose="020B0604020202020204" pitchFamily="34" charset="0"/>
-                <a:cs typeface="Arial" panose="020B0604020202020204" pitchFamily="34" charset="0"/>
-              </a:rPr>
-              <a:t>Manages </a:t>
-            </a:r>
-            <a:r>
-              <a:rPr lang="en-US" dirty="0">
-                <a:latin typeface="Arial" panose="020B0604020202020204" pitchFamily="34" charset="0"/>
-                <a:cs typeface="Arial" panose="020B0604020202020204" pitchFamily="34" charset="0"/>
-              </a:rPr>
-              <a:t>messy low-level details of dynamic analysis and provides  a clean API for communicating an event stream to back-end analysis tools</a:t>
-            </a:r>
-          </a:p>
-          <a:p>
-            <a:r>
-              <a:rPr lang="en-US" dirty="0" smtClean="0">
-                <a:latin typeface="Arial" panose="020B0604020202020204" pitchFamily="34" charset="0"/>
-                <a:cs typeface="Arial" panose="020B0604020202020204" pitchFamily="34" charset="0"/>
-              </a:rPr>
-              <a:t>Each </a:t>
-            </a:r>
-            <a:r>
-              <a:rPr lang="en-US" dirty="0">
-                <a:latin typeface="Arial" panose="020B0604020202020204" pitchFamily="34" charset="0"/>
-                <a:cs typeface="Arial" panose="020B0604020202020204" pitchFamily="34" charset="0"/>
-              </a:rPr>
-              <a:t>event describes some operation of interest performed by the target program, such as accessing memory, acquiring a lock, forking a new thread, etc.</a:t>
-            </a:r>
-          </a:p>
-          <a:p>
-            <a:r>
-              <a:rPr lang="en-US" dirty="0" smtClean="0">
-                <a:latin typeface="Arial" panose="020B0604020202020204" pitchFamily="34" charset="0"/>
-                <a:cs typeface="Arial" panose="020B0604020202020204" pitchFamily="34" charset="0"/>
-              </a:rPr>
-              <a:t>Separating </a:t>
-            </a:r>
-            <a:r>
-              <a:rPr lang="en-US" dirty="0">
-                <a:latin typeface="Arial" panose="020B0604020202020204" pitchFamily="34" charset="0"/>
-                <a:cs typeface="Arial" panose="020B0604020202020204" pitchFamily="34" charset="0"/>
-              </a:rPr>
-              <a:t>of events allow the developers to focus on essential algorithmic issues of a particular analysis, rather than on orthogonal infrastructures complexities </a:t>
-            </a:r>
-          </a:p>
-          <a:p>
-            <a:r>
-              <a:rPr lang="en-US" dirty="0" smtClean="0">
-                <a:latin typeface="Arial" panose="020B0604020202020204" pitchFamily="34" charset="0"/>
-                <a:cs typeface="Arial" panose="020B0604020202020204" pitchFamily="34" charset="0"/>
-              </a:rPr>
-              <a:t>Offers </a:t>
-            </a:r>
-            <a:r>
-              <a:rPr lang="en-US" dirty="0">
-                <a:latin typeface="Arial" panose="020B0604020202020204" pitchFamily="34" charset="0"/>
-                <a:cs typeface="Arial" panose="020B0604020202020204" pitchFamily="34" charset="0"/>
-              </a:rPr>
-              <a:t>comparable performance to traditional, monolithic analysis prototypes, while being up to an order of magnitude smaller in code size.</a:t>
-            </a:r>
-          </a:p>
-          <a:p>
-            <a:r>
-              <a:rPr lang="en-US" dirty="0" smtClean="0">
-                <a:latin typeface="Arial" panose="020B0604020202020204" pitchFamily="34" charset="0"/>
-                <a:cs typeface="Arial" panose="020B0604020202020204" pitchFamily="34" charset="0"/>
-              </a:rPr>
-              <a:t>Writing </a:t>
-            </a:r>
-            <a:r>
-              <a:rPr lang="en-US" dirty="0">
-                <a:latin typeface="Arial" panose="020B0604020202020204" pitchFamily="34" charset="0"/>
-                <a:cs typeface="Arial" panose="020B0604020202020204" pitchFamily="34" charset="0"/>
-              </a:rPr>
-              <a:t>a ROADRUNNER back-end analysis tool only requires defining methods to appropriately handle various events of interest.</a:t>
-            </a:r>
+            <a:endParaRPr lang="en-US"/>
           </a:p>
         </p:txBody>
       </p:sp>
     </p:spTree>
     <p:extLst>
       <p:ext uri="{BB962C8B-B14F-4D97-AF65-F5344CB8AC3E}">
-        <p14:creationId xmlns:p14="http://schemas.microsoft.com/office/powerpoint/2010/main" val="3761970419"/>
+        <p14:creationId xmlns:p14="http://schemas.microsoft.com/office/powerpoint/2010/main" val="3460582923"/>
       </p:ext>
     </p:extLst>
   </p:cSld>
@@ -5656,23 +4526,10 @@
           <a:lstStyle/>
           <a:p>
             <a:r>
-              <a:rPr lang="en-US" dirty="0" smtClean="0">
-                <a:latin typeface="Arial" panose="020B0604020202020204" pitchFamily="34" charset="0"/>
-                <a:cs typeface="Arial" panose="020B0604020202020204" pitchFamily="34" charset="0"/>
-              </a:rPr>
-              <a:t>Weaknesses of </a:t>
-            </a:r>
-            <a:r>
-              <a:rPr lang="en-US" dirty="0" err="1" smtClean="0">
-                <a:latin typeface="Arial" panose="020B0604020202020204" pitchFamily="34" charset="0"/>
-                <a:cs typeface="Arial" panose="020B0604020202020204" pitchFamily="34" charset="0"/>
-              </a:rPr>
-              <a:t>RoadRunner</a:t>
-            </a:r>
-            <a:endParaRPr lang="en-US" dirty="0">
-              <a:latin typeface="Arial" panose="020B0604020202020204" pitchFamily="34" charset="0"/>
-              <a:cs typeface="Arial" panose="020B0604020202020204" pitchFamily="34" charset="0"/>
-            </a:endParaRPr>
+              <a:rPr lang="en-US" dirty="0" smtClean="0"/>
+              <a:t>Weaknesses</a:t>
+            </a:r>
+            <a:endParaRPr lang="en-US" dirty="0"/>
           </a:p>
         </p:txBody>
       </p:sp>
@@ -5692,86 +4549,12 @@
           <a:lstStyle/>
           <a:p>
             <a:r>
-              <a:rPr lang="en-US" dirty="0" smtClean="0">
-                <a:latin typeface="Arial" panose="020B0604020202020204" pitchFamily="34" charset="0"/>
-                <a:cs typeface="Arial" panose="020B0604020202020204" pitchFamily="34" charset="0"/>
-              </a:rPr>
-              <a:t>Relies heavily on JVM </a:t>
-            </a:r>
-            <a:r>
-              <a:rPr lang="en-US" dirty="0" err="1" smtClean="0">
-                <a:latin typeface="Arial" panose="020B0604020202020204" pitchFamily="34" charset="0"/>
-                <a:cs typeface="Arial" panose="020B0604020202020204" pitchFamily="34" charset="0"/>
-              </a:rPr>
-              <a:t>Jit’s</a:t>
-            </a:r>
-            <a:r>
-              <a:rPr lang="en-US" dirty="0" smtClean="0">
-                <a:latin typeface="Arial" panose="020B0604020202020204" pitchFamily="34" charset="0"/>
-                <a:cs typeface="Arial" panose="020B0604020202020204" pitchFamily="34" charset="0"/>
-              </a:rPr>
-              <a:t> compiler.</a:t>
-            </a:r>
-          </a:p>
-          <a:p>
-            <a:r>
-              <a:rPr lang="en-US" dirty="0" smtClean="0">
-                <a:latin typeface="Arial" panose="020B0604020202020204" pitchFamily="34" charset="0"/>
-                <a:cs typeface="Arial" panose="020B0604020202020204" pitchFamily="34" charset="0"/>
-              </a:rPr>
-              <a:t>Processes each thread of the tool </a:t>
-            </a:r>
-            <a:r>
-              <a:rPr lang="en-US" dirty="0" err="1" smtClean="0">
-                <a:latin typeface="Arial" panose="020B0604020202020204" pitchFamily="34" charset="0"/>
-                <a:cs typeface="Arial" panose="020B0604020202020204" pitchFamily="34" charset="0"/>
-              </a:rPr>
-              <a:t>seperately</a:t>
-            </a:r>
-            <a:r>
-              <a:rPr lang="en-US" dirty="0" smtClean="0">
-                <a:latin typeface="Arial" panose="020B0604020202020204" pitchFamily="34" charset="0"/>
-                <a:cs typeface="Arial" panose="020B0604020202020204" pitchFamily="34" charset="0"/>
-              </a:rPr>
-              <a:t>.</a:t>
-            </a:r>
-          </a:p>
-          <a:p>
-            <a:r>
-              <a:rPr lang="en-US" dirty="0" smtClean="0">
-                <a:latin typeface="Arial" panose="020B0604020202020204" pitchFamily="34" charset="0"/>
-                <a:cs typeface="Arial" panose="020B0604020202020204" pitchFamily="34" charset="0"/>
-              </a:rPr>
-              <a:t>Scalability.</a:t>
-            </a:r>
-          </a:p>
-          <a:p>
-            <a:r>
-              <a:rPr lang="en-US" dirty="0" smtClean="0">
-                <a:latin typeface="Arial" panose="020B0604020202020204" pitchFamily="34" charset="0"/>
-                <a:cs typeface="Arial" panose="020B0604020202020204" pitchFamily="34" charset="0"/>
-              </a:rPr>
-              <a:t>Duplication of error detection</a:t>
-            </a:r>
-          </a:p>
-          <a:p>
-            <a:r>
-              <a:rPr lang="en-US" dirty="0" smtClean="0">
-                <a:latin typeface="Arial" panose="020B0604020202020204" pitchFamily="34" charset="0"/>
-                <a:cs typeface="Arial" panose="020B0604020202020204" pitchFamily="34" charset="0"/>
-              </a:rPr>
-              <a:t>Runtime order of tools matter.</a:t>
-            </a:r>
-            <a:endParaRPr lang="en-US" dirty="0" smtClean="0">
-              <a:latin typeface="Arial" panose="020B0604020202020204" pitchFamily="34" charset="0"/>
-              <a:cs typeface="Arial" panose="020B0604020202020204" pitchFamily="34" charset="0"/>
-            </a:endParaRPr>
-          </a:p>
-          <a:p>
-            <a:endParaRPr lang="en-US" dirty="0">
-              <a:latin typeface="Arial" panose="020B0604020202020204" pitchFamily="34" charset="0"/>
-              <a:cs typeface="Arial" panose="020B0604020202020204" pitchFamily="34" charset="0"/>
-            </a:endParaRPr>
+              <a:rPr lang="en-US" dirty="0" smtClean="0"/>
+              <a:t>While it supports many different tools, more complex algorithms such as Goldilocks will not fully work properly as it will not be implemented perfectly.</a:t>
+            </a:r>
+          </a:p>
+          <a:p>
+            <a:endParaRPr lang="en-US" dirty="0"/>
           </a:p>
         </p:txBody>
       </p:sp>
@@ -5828,16 +4611,10 @@
           <a:lstStyle/>
           <a:p>
             <a:r>
-              <a:rPr lang="en-US" dirty="0" smtClean="0">
-                <a:latin typeface="Arial" panose="020B0604020202020204" pitchFamily="34" charset="0"/>
-                <a:cs typeface="Arial" panose="020B0604020202020204" pitchFamily="34" charset="0"/>
-              </a:rPr>
-              <a:t>Challenges we faced…</a:t>
-            </a:r>
-            <a:endParaRPr lang="en-US" dirty="0">
-              <a:latin typeface="Arial" panose="020B0604020202020204" pitchFamily="34" charset="0"/>
-              <a:cs typeface="Arial" panose="020B0604020202020204" pitchFamily="34" charset="0"/>
-            </a:endParaRPr>
+              <a:rPr lang="en-US" dirty="0" smtClean="0"/>
+              <a:t>Challenges</a:t>
+            </a:r>
+            <a:endParaRPr lang="en-US" dirty="0"/>
           </a:p>
         </p:txBody>
       </p:sp>
@@ -5857,37 +4634,21 @@
           <a:lstStyle/>
           <a:p>
             <a:r>
-              <a:rPr lang="en-US" dirty="0" err="1" smtClean="0">
-                <a:latin typeface="Arial" panose="020B0604020202020204" pitchFamily="34" charset="0"/>
-                <a:cs typeface="Arial" panose="020B0604020202020204" pitchFamily="34" charset="0"/>
-              </a:rPr>
-              <a:t>Watashi</a:t>
-            </a:r>
-            <a:r>
-              <a:rPr lang="en-US" dirty="0" smtClean="0">
-                <a:latin typeface="Arial" panose="020B0604020202020204" pitchFamily="34" charset="0"/>
-                <a:cs typeface="Arial" panose="020B0604020202020204" pitchFamily="34" charset="0"/>
-              </a:rPr>
-              <a:t> </a:t>
-            </a:r>
-            <a:r>
-              <a:rPr lang="en-US" dirty="0" err="1" smtClean="0">
-                <a:latin typeface="Arial" panose="020B0604020202020204" pitchFamily="34" charset="0"/>
-                <a:cs typeface="Arial" panose="020B0604020202020204" pitchFamily="34" charset="0"/>
-              </a:rPr>
-              <a:t>wa</a:t>
-            </a:r>
-            <a:r>
-              <a:rPr lang="en-US" dirty="0" smtClean="0">
-                <a:latin typeface="Arial" panose="020B0604020202020204" pitchFamily="34" charset="0"/>
-                <a:cs typeface="Arial" panose="020B0604020202020204" pitchFamily="34" charset="0"/>
-              </a:rPr>
-              <a:t>…… ZERO</a:t>
-            </a:r>
-            <a:endParaRPr lang="en-US" dirty="0" smtClean="0">
-              <a:latin typeface="Arial" panose="020B0604020202020204" pitchFamily="34" charset="0"/>
-              <a:cs typeface="Arial" panose="020B0604020202020204" pitchFamily="34" charset="0"/>
-            </a:endParaRPr>
+              <a:rPr lang="en-US" dirty="0" smtClean="0"/>
+              <a:t>At first, we picked IBM Contest as our tool, but the code no longer existed, so we had to switch to LEAP, which did not </a:t>
+            </a:r>
+            <a:r>
+              <a:rPr lang="en-US" smtClean="0"/>
+              <a:t>build </a:t>
+            </a:r>
+            <a:r>
+              <a:rPr lang="en-US" smtClean="0"/>
+              <a:t>properly. </a:t>
+            </a:r>
+            <a:endParaRPr lang="en-US" smtClean="0"/>
+          </a:p>
+          <a:p>
+            <a:endParaRPr lang="en-US" dirty="0"/>
           </a:p>
         </p:txBody>
       </p:sp>

</xml_diff>